<commit_message>
One last thing about presentation
</commit_message>
<xml_diff>
--- a/Health & Care Office Presentation.pptx
+++ b/Health & Care Office Presentation.pptx
@@ -5,19 +5,20 @@
     <p:sldMasterId id="2147483660" r:id="rId1"/>
   </p:sldMasterIdLst>
   <p:notesMasterIdLst>
-    <p:notesMasterId r:id="rId12"/>
+    <p:notesMasterId r:id="rId13"/>
   </p:notesMasterIdLst>
   <p:sldIdLst>
     <p:sldId id="256" r:id="rId2"/>
     <p:sldId id="257" r:id="rId3"/>
     <p:sldId id="259" r:id="rId4"/>
     <p:sldId id="260" r:id="rId5"/>
-    <p:sldId id="261" r:id="rId6"/>
-    <p:sldId id="262" r:id="rId7"/>
-    <p:sldId id="264" r:id="rId8"/>
-    <p:sldId id="263" r:id="rId9"/>
-    <p:sldId id="265" r:id="rId10"/>
-    <p:sldId id="258" r:id="rId11"/>
+    <p:sldId id="266" r:id="rId6"/>
+    <p:sldId id="261" r:id="rId7"/>
+    <p:sldId id="262" r:id="rId8"/>
+    <p:sldId id="264" r:id="rId9"/>
+    <p:sldId id="263" r:id="rId10"/>
+    <p:sldId id="265" r:id="rId11"/>
+    <p:sldId id="258" r:id="rId12"/>
   </p:sldIdLst>
   <p:sldSz cx="9144000" cy="6858000" type="screen4x3"/>
   <p:notesSz cx="6858000" cy="9144000"/>
@@ -201,7 +202,7 @@
           <a:p>
             <a:fld id="{A53DBA03-AB18-49F8-A750-0B21F9B4BA9E}" type="datetimeFigureOut">
               <a:rPr lang="en-US" smtClean="0"/>
-              <a:t>06-Jan-18</a:t>
+              <a:t>07-Jan-18</a:t>
             </a:fld>
             <a:endParaRPr lang="en-US"/>
           </a:p>
@@ -534,7 +535,7 @@
           <a:p>
             <a:fld id="{AB606CDF-A222-4431-8D99-1459190DF360}" type="slidenum">
               <a:rPr lang="en-US" smtClean="0"/>
-              <a:t>5</a:t>
+              <a:t>6</a:t>
             </a:fld>
             <a:endParaRPr lang="en-US"/>
           </a:p>
@@ -763,7 +764,7 @@
           <a:p>
             <a:fld id="{C1524C58-BC04-4EDD-8539-8BC9FCFAEB20}" type="datetimeFigureOut">
               <a:rPr lang="en-US" smtClean="0"/>
-              <a:t>06-Jan-18</a:t>
+              <a:t>07-Jan-18</a:t>
             </a:fld>
             <a:endParaRPr lang="en-US"/>
           </a:p>
@@ -961,7 +962,7 @@
           <a:p>
             <a:fld id="{C1524C58-BC04-4EDD-8539-8BC9FCFAEB20}" type="datetimeFigureOut">
               <a:rPr lang="en-US" smtClean="0"/>
-              <a:t>06-Jan-18</a:t>
+              <a:t>07-Jan-18</a:t>
             </a:fld>
             <a:endParaRPr lang="en-US"/>
           </a:p>
@@ -1155,7 +1156,7 @@
           <a:p>
             <a:fld id="{C1524C58-BC04-4EDD-8539-8BC9FCFAEB20}" type="datetimeFigureOut">
               <a:rPr lang="en-US" smtClean="0"/>
-              <a:t>06-Jan-18</a:t>
+              <a:t>07-Jan-18</a:t>
             </a:fld>
             <a:endParaRPr lang="en-US"/>
           </a:p>
@@ -1360,7 +1361,7 @@
           <a:p>
             <a:fld id="{C1524C58-BC04-4EDD-8539-8BC9FCFAEB20}" type="datetimeFigureOut">
               <a:rPr lang="en-US" smtClean="0"/>
-              <a:t>06-Jan-18</a:t>
+              <a:t>07-Jan-18</a:t>
             </a:fld>
             <a:endParaRPr lang="en-US"/>
           </a:p>
@@ -1498,7 +1499,7 @@
           <a:p>
             <a:fld id="{C1524C58-BC04-4EDD-8539-8BC9FCFAEB20}" type="datetimeFigureOut">
               <a:rPr lang="en-US" smtClean="0"/>
-              <a:t>06-Jan-18</a:t>
+              <a:t>07-Jan-18</a:t>
             </a:fld>
             <a:endParaRPr lang="en-US"/>
           </a:p>
@@ -1899,7 +1900,7 @@
           <a:p>
             <a:fld id="{C1524C58-BC04-4EDD-8539-8BC9FCFAEB20}" type="datetimeFigureOut">
               <a:rPr lang="en-US" smtClean="0"/>
-              <a:t>06-Jan-18</a:t>
+              <a:t>07-Jan-18</a:t>
             </a:fld>
             <a:endParaRPr lang="en-US"/>
           </a:p>
@@ -2356,7 +2357,7 @@
           <a:p>
             <a:fld id="{C1524C58-BC04-4EDD-8539-8BC9FCFAEB20}" type="datetimeFigureOut">
               <a:rPr lang="en-US" smtClean="0"/>
-              <a:t>06-Jan-18</a:t>
+              <a:t>07-Jan-18</a:t>
             </a:fld>
             <a:endParaRPr lang="en-US"/>
           </a:p>
@@ -2493,7 +2494,7 @@
           <a:p>
             <a:fld id="{C1524C58-BC04-4EDD-8539-8BC9FCFAEB20}" type="datetimeFigureOut">
               <a:rPr lang="en-US" smtClean="0"/>
-              <a:t>06-Jan-18</a:t>
+              <a:t>07-Jan-18</a:t>
             </a:fld>
             <a:endParaRPr lang="en-US"/>
           </a:p>
@@ -2602,7 +2603,7 @@
           <a:p>
             <a:fld id="{C1524C58-BC04-4EDD-8539-8BC9FCFAEB20}" type="datetimeFigureOut">
               <a:rPr lang="en-US" smtClean="0"/>
-              <a:t>06-Jan-18</a:t>
+              <a:t>07-Jan-18</a:t>
             </a:fld>
             <a:endParaRPr lang="en-US"/>
           </a:p>
@@ -2905,7 +2906,7 @@
           <a:p>
             <a:fld id="{C1524C58-BC04-4EDD-8539-8BC9FCFAEB20}" type="datetimeFigureOut">
               <a:rPr lang="en-US" smtClean="0"/>
-              <a:t>06-Jan-18</a:t>
+              <a:t>07-Jan-18</a:t>
             </a:fld>
             <a:endParaRPr lang="en-US"/>
           </a:p>
@@ -3186,7 +3187,7 @@
           <a:p>
             <a:fld id="{C1524C58-BC04-4EDD-8539-8BC9FCFAEB20}" type="datetimeFigureOut">
               <a:rPr lang="en-US" smtClean="0"/>
-              <a:t>06-Jan-18</a:t>
+              <a:t>07-Jan-18</a:t>
             </a:fld>
             <a:endParaRPr lang="en-US"/>
           </a:p>
@@ -3480,7 +3481,7 @@
           <a:p>
             <a:fld id="{C1524C58-BC04-4EDD-8539-8BC9FCFAEB20}" type="datetimeFigureOut">
               <a:rPr lang="en-US" smtClean="0"/>
-              <a:t>06-Jan-18</a:t>
+              <a:t>07-Jan-18</a:t>
             </a:fld>
             <a:endParaRPr lang="en-US"/>
           </a:p>
@@ -4087,6 +4088,79 @@
           <a:chExt cx="0" cy="0"/>
         </a:xfrm>
       </p:grpSpPr>
+      <p:sp>
+        <p:nvSpPr>
+          <p:cNvPr id="6" name="TextBox 5"/>
+          <p:cNvSpPr txBox="1"/>
+          <p:nvPr/>
+        </p:nvSpPr>
+        <p:spPr>
+          <a:xfrm>
+            <a:off x="1295400" y="2057400"/>
+            <a:ext cx="6553200" cy="923330"/>
+          </a:xfrm>
+          <a:prstGeom prst="rect">
+            <a:avLst/>
+          </a:prstGeom>
+          <a:noFill/>
+        </p:spPr>
+        <p:txBody>
+          <a:bodyPr wrap="square" rtlCol="0">
+            <a:spAutoFit/>
+          </a:bodyPr>
+          <a:lstStyle/>
+          <a:p>
+            <a:pPr algn="ctr"/>
+            <a:r>
+              <a:rPr lang="el-GR" sz="5400" dirty="0" smtClean="0"/>
+              <a:t>Ερωτήσεις ;</a:t>
+            </a:r>
+            <a:endParaRPr lang="en-US" sz="5400" dirty="0"/>
+          </a:p>
+        </p:txBody>
+      </p:sp>
+    </p:spTree>
+    <p:extLst>
+      <p:ext uri="{BB962C8B-B14F-4D97-AF65-F5344CB8AC3E}">
+        <p14:creationId xmlns:p14="http://schemas.microsoft.com/office/powerpoint/2010/main" val="3528981670"/>
+      </p:ext>
+    </p:extLst>
+  </p:cSld>
+  <p:clrMapOvr>
+    <a:masterClrMapping/>
+  </p:clrMapOvr>
+  <mc:AlternateContent xmlns:mc="http://schemas.openxmlformats.org/markup-compatibility/2006" xmlns:p14="http://schemas.microsoft.com/office/powerpoint/2010/main">
+    <mc:Choice Requires="p14">
+      <p:transition spd="slow" p14:dur="800">
+        <p14:flythrough/>
+      </p:transition>
+    </mc:Choice>
+    <mc:Fallback xmlns="">
+      <p:transition spd="slow">
+        <p:fade/>
+      </p:transition>
+    </mc:Fallback>
+  </mc:AlternateContent>
+</p:sld>
+</file>
+
+<file path=ppt/slides/slide11.xml><?xml version="1.0" encoding="utf-8"?>
+<p:sld xmlns:a="http://schemas.openxmlformats.org/drawingml/2006/main" xmlns:r="http://schemas.openxmlformats.org/officeDocument/2006/relationships" xmlns:p="http://schemas.openxmlformats.org/presentationml/2006/main">
+  <p:cSld>
+    <p:spTree>
+      <p:nvGrpSpPr>
+        <p:cNvPr id="1" name=""/>
+        <p:cNvGrpSpPr/>
+        <p:nvPr/>
+      </p:nvGrpSpPr>
+      <p:grpSpPr>
+        <a:xfrm>
+          <a:off x="0" y="0"/>
+          <a:ext cx="0" cy="0"/>
+          <a:chOff x="0" y="0"/>
+          <a:chExt cx="0" cy="0"/>
+        </a:xfrm>
+      </p:grpSpPr>
       <p:pic>
         <p:nvPicPr>
           <p:cNvPr id="4" name="Content Placeholder 3"/>
@@ -4545,7 +4619,19 @@
             </a:r>
             <a:r>
               <a:rPr lang="el-GR" sz="3200" dirty="0" smtClean="0"/>
-              <a:t>είναι ένα εργαλείο διαχείρησης ιδιωτικών κυρίως ιατρείων . Οι δυνατότητες του αρκετές . Ο σχεδιασμός του όμορφος και απλός , εύκολος στην χρήση χωρίς υπερβολές.Ο σκοπός του είναι να εξυπηρετήσει τον χρήστη όσο καλύτερα γίνεται ,  και να κάνει ευχάριστη την χρηση του.</a:t>
+              <a:t>είναι ένα εργαλείο διαχείρησης ιδιωτικών κυρίως ιατρείων . Οι δυνατότητες του </a:t>
+            </a:r>
+            <a:r>
+              <a:rPr lang="el-GR" sz="3200" dirty="0" smtClean="0"/>
+              <a:t>συγκεκριμένες</a:t>
+            </a:r>
+            <a:r>
+              <a:rPr lang="el-GR" sz="3200" dirty="0" smtClean="0"/>
+              <a:t> </a:t>
+            </a:r>
+            <a:r>
+              <a:rPr lang="el-GR" sz="3200" dirty="0" smtClean="0"/>
+              <a:t>. Ο σχεδιασμός του όμορφος και απλός , εύκολος στην χρήση χωρίς υπερβολές.Ο σκοπός του είναι να εξυπηρετήσει τον χρήστη όσο καλύτερα γίνεται ,  και να κάνει ευχάριστη την χρηση του.</a:t>
             </a:r>
             <a:endParaRPr lang="en-US" sz="3200" dirty="0"/>
           </a:p>
@@ -4608,6 +4694,206 @@
         </p:nvSpPr>
         <p:spPr>
           <a:xfrm>
+            <a:off x="834736" y="914400"/>
+            <a:ext cx="7848600" cy="646331"/>
+          </a:xfrm>
+          <a:prstGeom prst="rect">
+            <a:avLst/>
+          </a:prstGeom>
+          <a:noFill/>
+        </p:spPr>
+        <p:txBody>
+          <a:bodyPr wrap="square" rtlCol="0">
+            <a:spAutoFit/>
+          </a:bodyPr>
+          <a:lstStyle/>
+          <a:p>
+            <a:pPr algn="ctr"/>
+            <a:r>
+              <a:rPr lang="el-GR" sz="3600" dirty="0" smtClean="0"/>
+              <a:t>Οι λειτουργείες του </a:t>
+            </a:r>
+            <a:r>
+              <a:rPr lang="en-US" sz="3600" dirty="0" smtClean="0"/>
+              <a:t>Health &amp; Care Office</a:t>
+            </a:r>
+            <a:endParaRPr lang="en-US" sz="3600" dirty="0"/>
+          </a:p>
+        </p:txBody>
+      </p:sp>
+      <p:sp>
+        <p:nvSpPr>
+          <p:cNvPr id="5" name="TextBox 4"/>
+          <p:cNvSpPr txBox="1"/>
+          <p:nvPr/>
+        </p:nvSpPr>
+        <p:spPr>
+          <a:xfrm>
+            <a:off x="834736" y="2362200"/>
+            <a:ext cx="7699664" cy="2585323"/>
+          </a:xfrm>
+          <a:prstGeom prst="rect">
+            <a:avLst/>
+          </a:prstGeom>
+          <a:noFill/>
+        </p:spPr>
+        <p:txBody>
+          <a:bodyPr wrap="square" rtlCol="0">
+            <a:spAutoFit/>
+          </a:bodyPr>
+          <a:lstStyle/>
+          <a:p>
+            <a:pPr marL="285750" indent="-285750">
+              <a:buFont typeface="Arial" pitchFamily="34" charset="0"/>
+              <a:buChar char="•"/>
+            </a:pPr>
+            <a:r>
+              <a:rPr lang="el-GR" dirty="0" smtClean="0"/>
+              <a:t>Καταχώρηση ραντεβού</a:t>
+            </a:r>
+          </a:p>
+          <a:p>
+            <a:pPr marL="285750" indent="-285750">
+              <a:buFont typeface="Arial" pitchFamily="34" charset="0"/>
+              <a:buChar char="•"/>
+            </a:pPr>
+            <a:r>
+              <a:rPr lang="el-GR" dirty="0" smtClean="0"/>
+              <a:t>Καταχώρηση πελατών στο σύστημα </a:t>
+            </a:r>
+          </a:p>
+          <a:p>
+            <a:pPr marL="285750" indent="-285750">
+              <a:buFont typeface="Arial" pitchFamily="34" charset="0"/>
+              <a:buChar char="•"/>
+            </a:pPr>
+            <a:r>
+              <a:rPr lang="el-GR" dirty="0" smtClean="0"/>
+              <a:t>Δυνατότητα εξαγωγής οφειλών για συγκεκριμένο διάστημα</a:t>
+            </a:r>
+          </a:p>
+          <a:p>
+            <a:pPr marL="285750" indent="-285750">
+              <a:buFont typeface="Arial" pitchFamily="34" charset="0"/>
+              <a:buChar char="•"/>
+            </a:pPr>
+            <a:r>
+              <a:rPr lang="el-GR" dirty="0" smtClean="0"/>
+              <a:t>Δυνατότητα </a:t>
+            </a:r>
+            <a:r>
+              <a:rPr lang="en-US" dirty="0" smtClean="0"/>
+              <a:t>backup </a:t>
+            </a:r>
+            <a:r>
+              <a:rPr lang="el-GR" dirty="0" smtClean="0"/>
+              <a:t>βάσης</a:t>
+            </a:r>
+          </a:p>
+          <a:p>
+            <a:pPr marL="285750" indent="-285750">
+              <a:buFont typeface="Arial" pitchFamily="34" charset="0"/>
+              <a:buChar char="•"/>
+            </a:pPr>
+            <a:r>
+              <a:rPr lang="el-GR" dirty="0" smtClean="0"/>
+              <a:t>Αναζήτηση πελάτη</a:t>
+            </a:r>
+          </a:p>
+          <a:p>
+            <a:pPr marL="285750" indent="-285750">
+              <a:buFont typeface="Arial" pitchFamily="34" charset="0"/>
+              <a:buChar char="•"/>
+            </a:pPr>
+            <a:r>
+              <a:rPr lang="el-GR" dirty="0"/>
+              <a:t>Δυνατότητα καταχώρησης κοστολογίου με βάση την εξέταση η την επέμβαση</a:t>
+            </a:r>
+            <a:endParaRPr lang="en-US" dirty="0"/>
+          </a:p>
+          <a:p>
+            <a:pPr marL="285750" indent="-285750">
+              <a:buFont typeface="Arial" pitchFamily="34" charset="0"/>
+              <a:buChar char="•"/>
+            </a:pPr>
+            <a:r>
+              <a:rPr lang="el-GR" dirty="0"/>
+              <a:t>Καταχώρηση λίστας αναλώσιμων και αποθήκευση του αποθέματος με </a:t>
+            </a:r>
+            <a:r>
+              <a:rPr lang="el-GR"/>
+              <a:t>προαιρετική </a:t>
+            </a:r>
+            <a:r>
+              <a:rPr lang="el-GR" smtClean="0"/>
+              <a:t>ρύθμιση</a:t>
+            </a:r>
+            <a:r>
+              <a:rPr lang="el-GR" dirty="0"/>
+              <a:t> </a:t>
+            </a:r>
+            <a:r>
+              <a:rPr lang="el-GR" smtClean="0"/>
+              <a:t>που </a:t>
+            </a:r>
+            <a:r>
+              <a:rPr lang="el-GR" dirty="0"/>
+              <a:t>ενημερώνει τον χρήστη ότι το απόθεμα τελειώνει και πρέπει να το ανανεώσει</a:t>
+            </a:r>
+            <a:endParaRPr lang="el-GR" dirty="0" smtClean="0"/>
+          </a:p>
+        </p:txBody>
+      </p:sp>
+    </p:spTree>
+    <p:extLst>
+      <p:ext uri="{BB962C8B-B14F-4D97-AF65-F5344CB8AC3E}">
+        <p14:creationId xmlns:p14="http://schemas.microsoft.com/office/powerpoint/2010/main" val="3733597749"/>
+      </p:ext>
+    </p:extLst>
+  </p:cSld>
+  <p:clrMapOvr>
+    <a:masterClrMapping/>
+  </p:clrMapOvr>
+  <mc:AlternateContent xmlns:mc="http://schemas.openxmlformats.org/markup-compatibility/2006" xmlns:p14="http://schemas.microsoft.com/office/powerpoint/2010/main">
+    <mc:Choice Requires="p14">
+      <p:transition spd="slow" p14:dur="800">
+        <p14:flythrough/>
+      </p:transition>
+    </mc:Choice>
+    <mc:Fallback xmlns="">
+      <p:transition spd="slow">
+        <p:fade/>
+      </p:transition>
+    </mc:Fallback>
+  </mc:AlternateContent>
+</p:sld>
+</file>
+
+<file path=ppt/slides/slide6.xml><?xml version="1.0" encoding="utf-8"?>
+<p:sld xmlns:a="http://schemas.openxmlformats.org/drawingml/2006/main" xmlns:r="http://schemas.openxmlformats.org/officeDocument/2006/relationships" xmlns:p="http://schemas.openxmlformats.org/presentationml/2006/main">
+  <p:cSld>
+    <p:spTree>
+      <p:nvGrpSpPr>
+        <p:cNvPr id="1" name=""/>
+        <p:cNvGrpSpPr/>
+        <p:nvPr/>
+      </p:nvGrpSpPr>
+      <p:grpSpPr>
+        <a:xfrm>
+          <a:off x="0" y="0"/>
+          <a:ext cx="0" cy="0"/>
+          <a:chOff x="0" y="0"/>
+          <a:chExt cx="0" cy="0"/>
+        </a:xfrm>
+      </p:grpSpPr>
+      <p:sp>
+        <p:nvSpPr>
+          <p:cNvPr id="4" name="TextBox 3"/>
+          <p:cNvSpPr txBox="1"/>
+          <p:nvPr/>
+        </p:nvSpPr>
+        <p:spPr>
+          <a:xfrm>
             <a:off x="533400" y="685800"/>
             <a:ext cx="8077200" cy="646331"/>
           </a:xfrm>
@@ -4669,120 +4955,6 @@
     <p:extLst>
       <p:ext uri="{BB962C8B-B14F-4D97-AF65-F5344CB8AC3E}">
         <p14:creationId xmlns:p14="http://schemas.microsoft.com/office/powerpoint/2010/main" val="506599361"/>
-      </p:ext>
-    </p:extLst>
-  </p:cSld>
-  <p:clrMapOvr>
-    <a:masterClrMapping/>
-  </p:clrMapOvr>
-  <mc:AlternateContent xmlns:mc="http://schemas.openxmlformats.org/markup-compatibility/2006" xmlns:p14="http://schemas.microsoft.com/office/powerpoint/2010/main">
-    <mc:Choice Requires="p14">
-      <p:transition spd="slow" p14:dur="800">
-        <p14:flythrough/>
-      </p:transition>
-    </mc:Choice>
-    <mc:Fallback xmlns="">
-      <p:transition spd="slow">
-        <p:fade/>
-      </p:transition>
-    </mc:Fallback>
-  </mc:AlternateContent>
-  <p:timing>
-    <p:tnLst>
-      <p:par>
-        <p:cTn id="1" dur="indefinite" restart="never" nodeType="tmRoot"/>
-      </p:par>
-    </p:tnLst>
-  </p:timing>
-</p:sld>
-</file>
-
-<file path=ppt/slides/slide6.xml><?xml version="1.0" encoding="utf-8"?>
-<p:sld xmlns:a="http://schemas.openxmlformats.org/drawingml/2006/main" xmlns:r="http://schemas.openxmlformats.org/officeDocument/2006/relationships" xmlns:p="http://schemas.openxmlformats.org/presentationml/2006/main">
-  <p:cSld>
-    <p:spTree>
-      <p:nvGrpSpPr>
-        <p:cNvPr id="1" name=""/>
-        <p:cNvGrpSpPr/>
-        <p:nvPr/>
-      </p:nvGrpSpPr>
-      <p:grpSpPr>
-        <a:xfrm>
-          <a:off x="0" y="0"/>
-          <a:ext cx="0" cy="0"/>
-          <a:chOff x="0" y="0"/>
-          <a:chExt cx="0" cy="0"/>
-        </a:xfrm>
-      </p:grpSpPr>
-      <p:sp>
-        <p:nvSpPr>
-          <p:cNvPr id="4" name="TextBox 3"/>
-          <p:cNvSpPr txBox="1"/>
-          <p:nvPr/>
-        </p:nvSpPr>
-        <p:spPr>
-          <a:xfrm>
-            <a:off x="1143000" y="762000"/>
-            <a:ext cx="7315200" cy="523220"/>
-          </a:xfrm>
-          <a:prstGeom prst="rect">
-            <a:avLst/>
-          </a:prstGeom>
-          <a:noFill/>
-        </p:spPr>
-        <p:txBody>
-          <a:bodyPr wrap="square" rtlCol="0">
-            <a:spAutoFit/>
-          </a:bodyPr>
-          <a:lstStyle/>
-          <a:p>
-            <a:pPr algn="ctr"/>
-            <a:r>
-              <a:rPr lang="el-GR" sz="2800" dirty="0" smtClean="0"/>
-              <a:t>Δυνατότητα εισαγωγής προσωπικού </a:t>
-            </a:r>
-            <a:r>
-              <a:rPr lang="en-US" sz="2800" dirty="0" smtClean="0"/>
-              <a:t>Register</a:t>
-            </a:r>
-            <a:endParaRPr lang="en-US" sz="2800" dirty="0"/>
-          </a:p>
-        </p:txBody>
-      </p:sp>
-      <p:pic>
-        <p:nvPicPr>
-          <p:cNvPr id="5" name="Picture 4"/>
-          <p:cNvPicPr>
-            <a:picLocks noChangeAspect="1"/>
-          </p:cNvPicPr>
-          <p:nvPr/>
-        </p:nvPicPr>
-        <p:blipFill>
-          <a:blip r:embed="rId2">
-            <a:extLst>
-              <a:ext uri="{28A0092B-C50C-407E-A947-70E740481C1C}">
-                <a14:useLocalDpi xmlns:a14="http://schemas.microsoft.com/office/drawing/2010/main" val="0"/>
-              </a:ext>
-            </a:extLst>
-          </a:blip>
-          <a:stretch>
-            <a:fillRect/>
-          </a:stretch>
-        </p:blipFill>
-        <p:spPr>
-          <a:xfrm>
-            <a:off x="1561432" y="1600200"/>
-            <a:ext cx="5982368" cy="4572000"/>
-          </a:xfrm>
-          <a:prstGeom prst="rect">
-            <a:avLst/>
-          </a:prstGeom>
-        </p:spPr>
-      </p:pic>
-    </p:spTree>
-    <p:extLst>
-      <p:ext uri="{BB962C8B-B14F-4D97-AF65-F5344CB8AC3E}">
-        <p14:creationId xmlns:p14="http://schemas.microsoft.com/office/powerpoint/2010/main" val="1876954791"/>
       </p:ext>
     </p:extLst>
   </p:cSld>
@@ -4836,8 +5008,8 @@
         </p:nvSpPr>
         <p:spPr>
           <a:xfrm>
-            <a:off x="1143000" y="609600"/>
-            <a:ext cx="7391400" cy="646331"/>
+            <a:off x="1143000" y="762000"/>
+            <a:ext cx="7315200" cy="523220"/>
           </a:xfrm>
           <a:prstGeom prst="rect">
             <a:avLst/>
@@ -4852,10 +5024,14 @@
           <a:p>
             <a:pPr algn="ctr"/>
             <a:r>
-              <a:rPr lang="el-GR" sz="3600" dirty="0" smtClean="0"/>
-              <a:t>Το κυρίως πρόγραμμα</a:t>
-            </a:r>
-            <a:endParaRPr lang="en-US" sz="3600" dirty="0"/>
+              <a:rPr lang="el-GR" sz="2800" dirty="0" smtClean="0"/>
+              <a:t>Δυνατότητα εισαγωγής προσωπικού </a:t>
+            </a:r>
+            <a:r>
+              <a:rPr lang="en-US" sz="2800" dirty="0" smtClean="0"/>
+              <a:t>Register</a:t>
+            </a:r>
+            <a:endParaRPr lang="en-US" sz="2800" dirty="0"/>
           </a:p>
         </p:txBody>
       </p:sp>
@@ -4881,8 +5057,8 @@
         </p:blipFill>
         <p:spPr>
           <a:xfrm>
-            <a:off x="581891" y="1524000"/>
-            <a:ext cx="8077200" cy="4885954"/>
+            <a:off x="1561432" y="1600200"/>
+            <a:ext cx="5982368" cy="4572000"/>
           </a:xfrm>
           <a:prstGeom prst="rect">
             <a:avLst/>
@@ -4892,7 +5068,7 @@
     </p:spTree>
     <p:extLst>
       <p:ext uri="{BB962C8B-B14F-4D97-AF65-F5344CB8AC3E}">
-        <p14:creationId xmlns:p14="http://schemas.microsoft.com/office/powerpoint/2010/main" val="4043660579"/>
+        <p14:creationId xmlns:p14="http://schemas.microsoft.com/office/powerpoint/2010/main" val="1876954791"/>
       </p:ext>
     </p:extLst>
   </p:cSld>
@@ -4946,8 +5122,8 @@
         </p:nvSpPr>
         <p:spPr>
           <a:xfrm>
-            <a:off x="775855" y="762000"/>
-            <a:ext cx="7772400" cy="584775"/>
+            <a:off x="1143000" y="609600"/>
+            <a:ext cx="7391400" cy="646331"/>
           </a:xfrm>
           <a:prstGeom prst="rect">
             <a:avLst/>
@@ -4962,14 +5138,10 @@
           <a:p>
             <a:pPr algn="ctr"/>
             <a:r>
-              <a:rPr lang="el-GR" sz="3200" dirty="0" smtClean="0"/>
-              <a:t>Η καρτέλα </a:t>
-            </a:r>
-            <a:r>
-              <a:rPr lang="en-US" sz="3200" dirty="0" smtClean="0"/>
-              <a:t>Patient</a:t>
-            </a:r>
-            <a:endParaRPr lang="en-US" sz="3200" dirty="0"/>
+              <a:rPr lang="el-GR" sz="3600" dirty="0" smtClean="0"/>
+              <a:t>Το κυρίως πρόγραμμα</a:t>
+            </a:r>
+            <a:endParaRPr lang="en-US" sz="3600" dirty="0"/>
           </a:p>
         </p:txBody>
       </p:sp>
@@ -4995,8 +5167,8 @@
         </p:blipFill>
         <p:spPr>
           <a:xfrm>
-            <a:off x="775855" y="1447800"/>
-            <a:ext cx="7730836" cy="4556460"/>
+            <a:off x="581891" y="1524000"/>
+            <a:ext cx="8077200" cy="4885954"/>
           </a:xfrm>
           <a:prstGeom prst="rect">
             <a:avLst/>
@@ -5006,7 +5178,7 @@
     </p:spTree>
     <p:extLst>
       <p:ext uri="{BB962C8B-B14F-4D97-AF65-F5344CB8AC3E}">
-        <p14:creationId xmlns:p14="http://schemas.microsoft.com/office/powerpoint/2010/main" val="3899055967"/>
+        <p14:creationId xmlns:p14="http://schemas.microsoft.com/office/powerpoint/2010/main" val="4043660579"/>
       </p:ext>
     </p:extLst>
   </p:cSld>
@@ -5054,14 +5226,14 @@
       </p:grpSpPr>
       <p:sp>
         <p:nvSpPr>
-          <p:cNvPr id="6" name="TextBox 5"/>
+          <p:cNvPr id="4" name="TextBox 3"/>
           <p:cNvSpPr txBox="1"/>
           <p:nvPr/>
         </p:nvSpPr>
         <p:spPr>
           <a:xfrm>
-            <a:off x="1295400" y="2057400"/>
-            <a:ext cx="6553200" cy="923330"/>
+            <a:off x="775855" y="762000"/>
+            <a:ext cx="7772400" cy="584775"/>
           </a:xfrm>
           <a:prstGeom prst="rect">
             <a:avLst/>
@@ -5076,17 +5248,51 @@
           <a:p>
             <a:pPr algn="ctr"/>
             <a:r>
-              <a:rPr lang="el-GR" sz="5400" dirty="0" smtClean="0"/>
-              <a:t>Ερωτήσεις ;</a:t>
-            </a:r>
-            <a:endParaRPr lang="en-US" sz="5400" dirty="0"/>
-          </a:p>
-        </p:txBody>
-      </p:sp>
+              <a:rPr lang="el-GR" sz="3200" dirty="0" smtClean="0"/>
+              <a:t>Η καρτέλα </a:t>
+            </a:r>
+            <a:r>
+              <a:rPr lang="en-US" sz="3200" dirty="0" smtClean="0"/>
+              <a:t>Patient</a:t>
+            </a:r>
+            <a:endParaRPr lang="en-US" sz="3200" dirty="0"/>
+          </a:p>
+        </p:txBody>
+      </p:sp>
+      <p:pic>
+        <p:nvPicPr>
+          <p:cNvPr id="5" name="Picture 4"/>
+          <p:cNvPicPr>
+            <a:picLocks noChangeAspect="1"/>
+          </p:cNvPicPr>
+          <p:nvPr/>
+        </p:nvPicPr>
+        <p:blipFill>
+          <a:blip r:embed="rId2">
+            <a:extLst>
+              <a:ext uri="{28A0092B-C50C-407E-A947-70E740481C1C}">
+                <a14:useLocalDpi xmlns:a14="http://schemas.microsoft.com/office/drawing/2010/main" val="0"/>
+              </a:ext>
+            </a:extLst>
+          </a:blip>
+          <a:stretch>
+            <a:fillRect/>
+          </a:stretch>
+        </p:blipFill>
+        <p:spPr>
+          <a:xfrm>
+            <a:off x="775855" y="1447800"/>
+            <a:ext cx="7730836" cy="4556460"/>
+          </a:xfrm>
+          <a:prstGeom prst="rect">
+            <a:avLst/>
+          </a:prstGeom>
+        </p:spPr>
+      </p:pic>
     </p:spTree>
     <p:extLst>
       <p:ext uri="{BB962C8B-B14F-4D97-AF65-F5344CB8AC3E}">
-        <p14:creationId xmlns:p14="http://schemas.microsoft.com/office/powerpoint/2010/main" val="3528981670"/>
+        <p14:creationId xmlns:p14="http://schemas.microsoft.com/office/powerpoint/2010/main" val="3899055967"/>
       </p:ext>
     </p:extLst>
   </p:cSld>
@@ -5105,6 +5311,13 @@
       </p:transition>
     </mc:Fallback>
   </mc:AlternateContent>
+  <p:timing>
+    <p:tnLst>
+      <p:par>
+        <p:cTn id="1" dur="indefinite" restart="never" nodeType="tmRoot"/>
+      </p:par>
+    </p:tnLst>
+  </p:timing>
 </p:sld>
 </file>
 

</xml_diff>